<commit_message>
minor update to ppt
</commit_message>
<xml_diff>
--- a/Mocking/CodingDojo_Mocking.pptx
+++ b/Mocking/CodingDojo_Mocking.pptx
@@ -5,7 +5,7 @@
     <p:sldMasterId id="2147483667" r:id="rId1"/>
   </p:sldMasterIdLst>
   <p:notesMasterIdLst>
-    <p:notesMasterId r:id="rId12"/>
+    <p:notesMasterId r:id="rId13"/>
   </p:notesMasterIdLst>
   <p:sldIdLst>
     <p:sldId id="270" r:id="rId2"/>
@@ -15,9 +15,10 @@
     <p:sldId id="286" r:id="rId6"/>
     <p:sldId id="287" r:id="rId7"/>
     <p:sldId id="288" r:id="rId8"/>
-    <p:sldId id="289" r:id="rId9"/>
-    <p:sldId id="283" r:id="rId10"/>
-    <p:sldId id="285" r:id="rId11"/>
+    <p:sldId id="290" r:id="rId9"/>
+    <p:sldId id="289" r:id="rId10"/>
+    <p:sldId id="283" r:id="rId11"/>
+    <p:sldId id="285" r:id="rId12"/>
   </p:sldIdLst>
   <p:sldSz cx="12192000" cy="6858000"/>
   <p:notesSz cx="6858000" cy="9144000"/>
@@ -217,7 +218,7 @@
           <a:p>
             <a:fld id="{550C01F7-036F-4DDB-91D3-72DE411FB950}" type="datetimeFigureOut">
               <a:rPr lang="de-AT" smtClean="0"/>
-              <a:t>18.07.2022</a:t>
+              <a:t>18.08.2022</a:t>
             </a:fld>
             <a:endParaRPr lang="de-AT"/>
           </a:p>
@@ -1560,7 +1561,7 @@
           <a:p>
             <a:fld id="{222DE6FD-D7F2-49F0-A0DD-6365E6F7E0B0}" type="slidenum">
               <a:rPr lang="de-AT" smtClean="0"/>
-              <a:t>9</a:t>
+              <a:t>10</a:t>
             </a:fld>
             <a:endParaRPr lang="de-AT"/>
           </a:p>
@@ -2981,7 +2982,7 @@
           <a:p>
             <a:fld id="{4F9BBA49-313F-47D7-A954-C3F504465317}" type="datetimeFigureOut">
               <a:rPr lang="de-AT" smtClean="0"/>
-              <a:t>18.07.2022</a:t>
+              <a:t>18.08.2022</a:t>
             </a:fld>
             <a:endParaRPr lang="de-AT"/>
           </a:p>
@@ -3151,7 +3152,7 @@
           <a:p>
             <a:fld id="{4F9BBA49-313F-47D7-A954-C3F504465317}" type="datetimeFigureOut">
               <a:rPr lang="de-AT" smtClean="0"/>
-              <a:t>18.07.2022</a:t>
+              <a:t>18.08.2022</a:t>
             </a:fld>
             <a:endParaRPr lang="de-AT"/>
           </a:p>
@@ -6523,6 +6524,334 @@
 </file>
 
 <file path=ppt/slides/slide10.xml><?xml version="1.0" encoding="utf-8"?>
+<p:sld xmlns:a="http://schemas.openxmlformats.org/drawingml/2006/main" xmlns:r="http://schemas.openxmlformats.org/officeDocument/2006/relationships" xmlns:p="http://schemas.openxmlformats.org/presentationml/2006/main">
+  <p:cSld>
+    <p:spTree>
+      <p:nvGrpSpPr>
+        <p:cNvPr id="1" name=""/>
+        <p:cNvGrpSpPr/>
+        <p:nvPr/>
+      </p:nvGrpSpPr>
+      <p:grpSpPr>
+        <a:xfrm>
+          <a:off x="0" y="0"/>
+          <a:ext cx="0" cy="0"/>
+          <a:chOff x="0" y="0"/>
+          <a:chExt cx="0" cy="0"/>
+        </a:xfrm>
+      </p:grpSpPr>
+      <p:sp>
+        <p:nvSpPr>
+          <p:cNvPr id="2" name="Title 1">
+            <a:extLst>
+              <a:ext uri="{FF2B5EF4-FFF2-40B4-BE49-F238E27FC236}">
+                <a16:creationId xmlns:a16="http://schemas.microsoft.com/office/drawing/2014/main" id="{9E36F4ED-769D-49BA-8930-4C7CE2636CA3}"/>
+              </a:ext>
+            </a:extLst>
+          </p:cNvPr>
+          <p:cNvSpPr>
+            <a:spLocks noGrp="1"/>
+          </p:cNvSpPr>
+          <p:nvPr>
+            <p:ph type="title"/>
+          </p:nvPr>
+        </p:nvSpPr>
+        <p:spPr/>
+        <p:txBody>
+          <a:bodyPr/>
+          <a:lstStyle/>
+          <a:p>
+            <a:r>
+              <a:rPr lang="en-US" dirty="0"/>
+              <a:t>Setup</a:t>
+            </a:r>
+            <a:endParaRPr lang="de-AT" dirty="0"/>
+          </a:p>
+        </p:txBody>
+      </p:sp>
+      <p:sp>
+        <p:nvSpPr>
+          <p:cNvPr id="3" name="Content Placeholder 2">
+            <a:extLst>
+              <a:ext uri="{FF2B5EF4-FFF2-40B4-BE49-F238E27FC236}">
+                <a16:creationId xmlns:a16="http://schemas.microsoft.com/office/drawing/2014/main" id="{0AFE0005-C90E-4ED3-9B5C-6119CEAE399E}"/>
+              </a:ext>
+            </a:extLst>
+          </p:cNvPr>
+          <p:cNvSpPr>
+            <a:spLocks noGrp="1"/>
+          </p:cNvSpPr>
+          <p:nvPr>
+            <p:ph type="body" sz="quarter" idx="13"/>
+          </p:nvPr>
+        </p:nvSpPr>
+        <p:spPr/>
+        <p:txBody>
+          <a:bodyPr/>
+          <a:lstStyle/>
+          <a:p>
+            <a:pPr marL="457200" lvl="1" indent="0">
+              <a:buNone/>
+            </a:pPr>
+            <a:endParaRPr lang="de-AT" dirty="0"/>
+          </a:p>
+          <a:p>
+            <a:endParaRPr lang="de-AT" dirty="0"/>
+          </a:p>
+        </p:txBody>
+      </p:sp>
+      <p:sp>
+        <p:nvSpPr>
+          <p:cNvPr id="5" name="Content Placeholder 2"/>
+          <p:cNvSpPr txBox="1">
+            <a:spLocks/>
+          </p:cNvSpPr>
+          <p:nvPr/>
+        </p:nvSpPr>
+        <p:spPr>
+          <a:xfrm>
+            <a:off x="838200" y="1825625"/>
+            <a:ext cx="10515600" cy="4351338"/>
+          </a:xfrm>
+          <a:prstGeom prst="rect">
+            <a:avLst/>
+          </a:prstGeom>
+        </p:spPr>
+        <p:txBody>
+          <a:bodyPr vert="horz" lIns="91440" tIns="45720" rIns="91440" bIns="45720" rtlCol="0">
+            <a:normAutofit/>
+          </a:bodyPr>
+          <a:lstStyle>
+            <a:lvl1pPr marL="228600" indent="-228600" algn="l" defTabSz="914400" rtl="0" eaLnBrk="1" latinLnBrk="0" hangingPunct="1">
+              <a:lnSpc>
+                <a:spcPct val="90000"/>
+              </a:lnSpc>
+              <a:spcBef>
+                <a:spcPts val="1000"/>
+              </a:spcBef>
+              <a:buFont typeface="Arial" panose="020B0604020202020204" pitchFamily="34" charset="0"/>
+              <a:buChar char="•"/>
+              <a:defRPr sz="2800" kern="1200">
+                <a:solidFill>
+                  <a:schemeClr val="tx1"/>
+                </a:solidFill>
+                <a:latin typeface="+mn-lt"/>
+                <a:ea typeface="+mn-ea"/>
+                <a:cs typeface="+mn-cs"/>
+              </a:defRPr>
+            </a:lvl1pPr>
+            <a:lvl2pPr marL="685800" indent="-228600" algn="l" defTabSz="914400" rtl="0" eaLnBrk="1" latinLnBrk="0" hangingPunct="1">
+              <a:lnSpc>
+                <a:spcPct val="90000"/>
+              </a:lnSpc>
+              <a:spcBef>
+                <a:spcPts val="500"/>
+              </a:spcBef>
+              <a:buFont typeface="Arial" panose="020B0604020202020204" pitchFamily="34" charset="0"/>
+              <a:buChar char="•"/>
+              <a:defRPr sz="2400" kern="1200">
+                <a:solidFill>
+                  <a:schemeClr val="tx1"/>
+                </a:solidFill>
+                <a:latin typeface="+mn-lt"/>
+                <a:ea typeface="+mn-ea"/>
+                <a:cs typeface="+mn-cs"/>
+              </a:defRPr>
+            </a:lvl2pPr>
+            <a:lvl3pPr marL="1143000" indent="-228600" algn="l" defTabSz="914400" rtl="0" eaLnBrk="1" latinLnBrk="0" hangingPunct="1">
+              <a:lnSpc>
+                <a:spcPct val="90000"/>
+              </a:lnSpc>
+              <a:spcBef>
+                <a:spcPts val="500"/>
+              </a:spcBef>
+              <a:buFont typeface="Arial" panose="020B0604020202020204" pitchFamily="34" charset="0"/>
+              <a:buChar char="•"/>
+              <a:defRPr sz="2000" kern="1200">
+                <a:solidFill>
+                  <a:schemeClr val="tx1"/>
+                </a:solidFill>
+                <a:latin typeface="+mn-lt"/>
+                <a:ea typeface="+mn-ea"/>
+                <a:cs typeface="+mn-cs"/>
+              </a:defRPr>
+            </a:lvl3pPr>
+            <a:lvl4pPr marL="1600200" indent="-228600" algn="l" defTabSz="914400" rtl="0" eaLnBrk="1" latinLnBrk="0" hangingPunct="1">
+              <a:lnSpc>
+                <a:spcPct val="90000"/>
+              </a:lnSpc>
+              <a:spcBef>
+                <a:spcPts val="500"/>
+              </a:spcBef>
+              <a:buFont typeface="Arial" panose="020B0604020202020204" pitchFamily="34" charset="0"/>
+              <a:buChar char="•"/>
+              <a:defRPr sz="1800" kern="1200">
+                <a:solidFill>
+                  <a:schemeClr val="tx1"/>
+                </a:solidFill>
+                <a:latin typeface="+mn-lt"/>
+                <a:ea typeface="+mn-ea"/>
+                <a:cs typeface="+mn-cs"/>
+              </a:defRPr>
+            </a:lvl4pPr>
+            <a:lvl5pPr marL="2057400" indent="-228600" algn="l" defTabSz="914400" rtl="0" eaLnBrk="1" latinLnBrk="0" hangingPunct="1">
+              <a:lnSpc>
+                <a:spcPct val="90000"/>
+              </a:lnSpc>
+              <a:spcBef>
+                <a:spcPts val="500"/>
+              </a:spcBef>
+              <a:buFont typeface="Arial" panose="020B0604020202020204" pitchFamily="34" charset="0"/>
+              <a:buChar char="•"/>
+              <a:defRPr sz="1800" kern="1200">
+                <a:solidFill>
+                  <a:schemeClr val="tx1"/>
+                </a:solidFill>
+                <a:latin typeface="+mn-lt"/>
+                <a:ea typeface="+mn-ea"/>
+                <a:cs typeface="+mn-cs"/>
+              </a:defRPr>
+            </a:lvl5pPr>
+            <a:lvl6pPr marL="2514600" indent="-228600" algn="l" defTabSz="914400" rtl="0" eaLnBrk="1" latinLnBrk="0" hangingPunct="1">
+              <a:lnSpc>
+                <a:spcPct val="90000"/>
+              </a:lnSpc>
+              <a:spcBef>
+                <a:spcPts val="500"/>
+              </a:spcBef>
+              <a:buFont typeface="Arial" panose="020B0604020202020204" pitchFamily="34" charset="0"/>
+              <a:buChar char="•"/>
+              <a:defRPr sz="1800" kern="1200">
+                <a:solidFill>
+                  <a:schemeClr val="tx1"/>
+                </a:solidFill>
+                <a:latin typeface="+mn-lt"/>
+                <a:ea typeface="+mn-ea"/>
+                <a:cs typeface="+mn-cs"/>
+              </a:defRPr>
+            </a:lvl6pPr>
+            <a:lvl7pPr marL="2971800" indent="-228600" algn="l" defTabSz="914400" rtl="0" eaLnBrk="1" latinLnBrk="0" hangingPunct="1">
+              <a:lnSpc>
+                <a:spcPct val="90000"/>
+              </a:lnSpc>
+              <a:spcBef>
+                <a:spcPts val="500"/>
+              </a:spcBef>
+              <a:buFont typeface="Arial" panose="020B0604020202020204" pitchFamily="34" charset="0"/>
+              <a:buChar char="•"/>
+              <a:defRPr sz="1800" kern="1200">
+                <a:solidFill>
+                  <a:schemeClr val="tx1"/>
+                </a:solidFill>
+                <a:latin typeface="+mn-lt"/>
+                <a:ea typeface="+mn-ea"/>
+                <a:cs typeface="+mn-cs"/>
+              </a:defRPr>
+            </a:lvl7pPr>
+            <a:lvl8pPr marL="3429000" indent="-228600" algn="l" defTabSz="914400" rtl="0" eaLnBrk="1" latinLnBrk="0" hangingPunct="1">
+              <a:lnSpc>
+                <a:spcPct val="90000"/>
+              </a:lnSpc>
+              <a:spcBef>
+                <a:spcPts val="500"/>
+              </a:spcBef>
+              <a:buFont typeface="Arial" panose="020B0604020202020204" pitchFamily="34" charset="0"/>
+              <a:buChar char="•"/>
+              <a:defRPr sz="1800" kern="1200">
+                <a:solidFill>
+                  <a:schemeClr val="tx1"/>
+                </a:solidFill>
+                <a:latin typeface="+mn-lt"/>
+                <a:ea typeface="+mn-ea"/>
+                <a:cs typeface="+mn-cs"/>
+              </a:defRPr>
+            </a:lvl8pPr>
+            <a:lvl9pPr marL="3886200" indent="-228600" algn="l" defTabSz="914400" rtl="0" eaLnBrk="1" latinLnBrk="0" hangingPunct="1">
+              <a:lnSpc>
+                <a:spcPct val="90000"/>
+              </a:lnSpc>
+              <a:spcBef>
+                <a:spcPts val="500"/>
+              </a:spcBef>
+              <a:buFont typeface="Arial" panose="020B0604020202020204" pitchFamily="34" charset="0"/>
+              <a:buChar char="•"/>
+              <a:defRPr sz="1800" kern="1200">
+                <a:solidFill>
+                  <a:schemeClr val="tx1"/>
+                </a:solidFill>
+                <a:latin typeface="+mn-lt"/>
+                <a:ea typeface="+mn-ea"/>
+                <a:cs typeface="+mn-cs"/>
+              </a:defRPr>
+            </a:lvl9pPr>
+          </a:lstStyle>
+          <a:p>
+            <a:pPr marL="285750" indent="-285750">
+              <a:buFont typeface="Arial" panose="020B0604020202020204" pitchFamily="34" charset="0"/>
+              <a:buChar char="•"/>
+            </a:pPr>
+            <a:r>
+              <a:rPr lang="de-AT" dirty="0">
+                <a:hlinkClick r:id="rId3"/>
+              </a:rPr>
+              <a:t>https://github.com/techtalk/CodingDojos.git</a:t>
+            </a:r>
+            <a:endParaRPr lang="de-AT" dirty="0"/>
+          </a:p>
+          <a:p>
+            <a:pPr lvl="1"/>
+            <a:r>
+              <a:rPr lang="en-GB" dirty="0"/>
+              <a:t>Branch “</a:t>
+            </a:r>
+            <a:r>
+              <a:rPr lang="en-GB" dirty="0" err="1"/>
+              <a:t>MockingDojo</a:t>
+            </a:r>
+            <a:r>
+              <a:rPr lang="en-GB" dirty="0"/>
+              <a:t>”</a:t>
+            </a:r>
+          </a:p>
+          <a:p>
+            <a:endParaRPr lang="en-GB" dirty="0"/>
+          </a:p>
+          <a:p>
+            <a:r>
+              <a:rPr lang="en-GB" dirty="0"/>
+              <a:t>https://www.tutorialspoint.com/design_pattern/strategy_pattern.htm</a:t>
+            </a:r>
+          </a:p>
+          <a:p>
+            <a:endParaRPr lang="en-GB" dirty="0"/>
+          </a:p>
+          <a:p>
+            <a:pPr lvl="2"/>
+            <a:endParaRPr lang="en-GB" dirty="0"/>
+          </a:p>
+          <a:p>
+            <a:pPr lvl="1"/>
+            <a:endParaRPr lang="en-GB" dirty="0"/>
+          </a:p>
+          <a:p>
+            <a:endParaRPr lang="en-GB" dirty="0"/>
+          </a:p>
+        </p:txBody>
+      </p:sp>
+    </p:spTree>
+    <p:extLst>
+      <p:ext uri="{BB962C8B-B14F-4D97-AF65-F5344CB8AC3E}">
+        <p14:creationId xmlns:p14="http://schemas.microsoft.com/office/powerpoint/2010/main" val="355067626"/>
+      </p:ext>
+    </p:extLst>
+  </p:cSld>
+  <p:clrMapOvr>
+    <a:masterClrMapping/>
+  </p:clrMapOvr>
+</p:sld>
+</file>
+
+<file path=ppt/slides/slide11.xml><?xml version="1.0" encoding="utf-8"?>
 <p:sld xmlns:a="http://schemas.openxmlformats.org/drawingml/2006/main" xmlns:r="http://schemas.openxmlformats.org/officeDocument/2006/relationships" xmlns:p="http://schemas.openxmlformats.org/presentationml/2006/main">
   <p:cSld>
     <p:spTree>
@@ -8824,6 +9153,359 @@
   <p:clrMapOvr>
     <a:masterClrMapping/>
   </p:clrMapOvr>
+  <p:timing>
+    <p:tnLst>
+      <p:par>
+        <p:cTn id="1" dur="indefinite" restart="never" nodeType="tmRoot">
+          <p:childTnLst>
+            <p:seq concurrent="1" nextAc="seek">
+              <p:cTn id="2" dur="indefinite" nodeType="mainSeq">
+                <p:childTnLst>
+                  <p:par>
+                    <p:cTn id="3" fill="hold">
+                      <p:stCondLst>
+                        <p:cond delay="indefinite"/>
+                      </p:stCondLst>
+                      <p:childTnLst>
+                        <p:par>
+                          <p:cTn id="4" fill="hold">
+                            <p:stCondLst>
+                              <p:cond delay="0"/>
+                            </p:stCondLst>
+                            <p:childTnLst>
+                              <p:par>
+                                <p:cTn id="5" presetID="1" presetClass="entr" presetSubtype="0" fill="hold" grpId="0" nodeType="clickEffect">
+                                  <p:stCondLst>
+                                    <p:cond delay="0"/>
+                                  </p:stCondLst>
+                                  <p:childTnLst>
+                                    <p:set>
+                                      <p:cBhvr>
+                                        <p:cTn id="6" dur="1" fill="hold">
+                                          <p:stCondLst>
+                                            <p:cond delay="0"/>
+                                          </p:stCondLst>
+                                        </p:cTn>
+                                        <p:tgtEl>
+                                          <p:spTgt spid="5">
+                                            <p:txEl>
+                                              <p:pRg st="0" end="0"/>
+                                            </p:txEl>
+                                          </p:spTgt>
+                                        </p:tgtEl>
+                                        <p:attrNameLst>
+                                          <p:attrName>style.visibility</p:attrName>
+                                        </p:attrNameLst>
+                                      </p:cBhvr>
+                                      <p:to>
+                                        <p:strVal val="visible"/>
+                                      </p:to>
+                                    </p:set>
+                                  </p:childTnLst>
+                                </p:cTn>
+                              </p:par>
+                              <p:par>
+                                <p:cTn id="7" presetID="1" presetClass="entr" presetSubtype="0" fill="hold" grpId="0" nodeType="withEffect">
+                                  <p:stCondLst>
+                                    <p:cond delay="0"/>
+                                  </p:stCondLst>
+                                  <p:childTnLst>
+                                    <p:set>
+                                      <p:cBhvr>
+                                        <p:cTn id="8" dur="1" fill="hold">
+                                          <p:stCondLst>
+                                            <p:cond delay="0"/>
+                                          </p:stCondLst>
+                                        </p:cTn>
+                                        <p:tgtEl>
+                                          <p:spTgt spid="5">
+                                            <p:txEl>
+                                              <p:pRg st="1" end="1"/>
+                                            </p:txEl>
+                                          </p:spTgt>
+                                        </p:tgtEl>
+                                        <p:attrNameLst>
+                                          <p:attrName>style.visibility</p:attrName>
+                                        </p:attrNameLst>
+                                      </p:cBhvr>
+                                      <p:to>
+                                        <p:strVal val="visible"/>
+                                      </p:to>
+                                    </p:set>
+                                  </p:childTnLst>
+                                </p:cTn>
+                              </p:par>
+                              <p:par>
+                                <p:cTn id="9" presetID="1" presetClass="entr" presetSubtype="0" fill="hold" grpId="0" nodeType="withEffect">
+                                  <p:stCondLst>
+                                    <p:cond delay="0"/>
+                                  </p:stCondLst>
+                                  <p:childTnLst>
+                                    <p:set>
+                                      <p:cBhvr>
+                                        <p:cTn id="10" dur="1" fill="hold">
+                                          <p:stCondLst>
+                                            <p:cond delay="0"/>
+                                          </p:stCondLst>
+                                        </p:cTn>
+                                        <p:tgtEl>
+                                          <p:spTgt spid="5">
+                                            <p:txEl>
+                                              <p:pRg st="2" end="2"/>
+                                            </p:txEl>
+                                          </p:spTgt>
+                                        </p:tgtEl>
+                                        <p:attrNameLst>
+                                          <p:attrName>style.visibility</p:attrName>
+                                        </p:attrNameLst>
+                                      </p:cBhvr>
+                                      <p:to>
+                                        <p:strVal val="visible"/>
+                                      </p:to>
+                                    </p:set>
+                                  </p:childTnLst>
+                                </p:cTn>
+                              </p:par>
+                            </p:childTnLst>
+                          </p:cTn>
+                        </p:par>
+                      </p:childTnLst>
+                    </p:cTn>
+                  </p:par>
+                  <p:par>
+                    <p:cTn id="11" fill="hold">
+                      <p:stCondLst>
+                        <p:cond delay="indefinite"/>
+                      </p:stCondLst>
+                      <p:childTnLst>
+                        <p:par>
+                          <p:cTn id="12" fill="hold">
+                            <p:stCondLst>
+                              <p:cond delay="0"/>
+                            </p:stCondLst>
+                            <p:childTnLst>
+                              <p:par>
+                                <p:cTn id="13" presetID="1" presetClass="entr" presetSubtype="0" fill="hold" grpId="0" nodeType="clickEffect">
+                                  <p:stCondLst>
+                                    <p:cond delay="0"/>
+                                  </p:stCondLst>
+                                  <p:childTnLst>
+                                    <p:set>
+                                      <p:cBhvr>
+                                        <p:cTn id="14" dur="1" fill="hold">
+                                          <p:stCondLst>
+                                            <p:cond delay="0"/>
+                                          </p:stCondLst>
+                                        </p:cTn>
+                                        <p:tgtEl>
+                                          <p:spTgt spid="5">
+                                            <p:txEl>
+                                              <p:pRg st="3" end="3"/>
+                                            </p:txEl>
+                                          </p:spTgt>
+                                        </p:tgtEl>
+                                        <p:attrNameLst>
+                                          <p:attrName>style.visibility</p:attrName>
+                                        </p:attrNameLst>
+                                      </p:cBhvr>
+                                      <p:to>
+                                        <p:strVal val="visible"/>
+                                      </p:to>
+                                    </p:set>
+                                  </p:childTnLst>
+                                </p:cTn>
+                              </p:par>
+                              <p:par>
+                                <p:cTn id="15" presetID="1" presetClass="entr" presetSubtype="0" fill="hold" grpId="0" nodeType="withEffect">
+                                  <p:stCondLst>
+                                    <p:cond delay="0"/>
+                                  </p:stCondLst>
+                                  <p:childTnLst>
+                                    <p:set>
+                                      <p:cBhvr>
+                                        <p:cTn id="16" dur="1" fill="hold">
+                                          <p:stCondLst>
+                                            <p:cond delay="0"/>
+                                          </p:stCondLst>
+                                        </p:cTn>
+                                        <p:tgtEl>
+                                          <p:spTgt spid="5">
+                                            <p:txEl>
+                                              <p:pRg st="4" end="4"/>
+                                            </p:txEl>
+                                          </p:spTgt>
+                                        </p:tgtEl>
+                                        <p:attrNameLst>
+                                          <p:attrName>style.visibility</p:attrName>
+                                        </p:attrNameLst>
+                                      </p:cBhvr>
+                                      <p:to>
+                                        <p:strVal val="visible"/>
+                                      </p:to>
+                                    </p:set>
+                                  </p:childTnLst>
+                                </p:cTn>
+                              </p:par>
+                            </p:childTnLst>
+                          </p:cTn>
+                        </p:par>
+                      </p:childTnLst>
+                    </p:cTn>
+                  </p:par>
+                  <p:par>
+                    <p:cTn id="17" fill="hold">
+                      <p:stCondLst>
+                        <p:cond delay="indefinite"/>
+                      </p:stCondLst>
+                      <p:childTnLst>
+                        <p:par>
+                          <p:cTn id="18" fill="hold">
+                            <p:stCondLst>
+                              <p:cond delay="0"/>
+                            </p:stCondLst>
+                            <p:childTnLst>
+                              <p:par>
+                                <p:cTn id="19" presetID="1" presetClass="entr" presetSubtype="0" fill="hold" grpId="0" nodeType="clickEffect">
+                                  <p:stCondLst>
+                                    <p:cond delay="0"/>
+                                  </p:stCondLst>
+                                  <p:childTnLst>
+                                    <p:set>
+                                      <p:cBhvr>
+                                        <p:cTn id="20" dur="1" fill="hold">
+                                          <p:stCondLst>
+                                            <p:cond delay="0"/>
+                                          </p:stCondLst>
+                                        </p:cTn>
+                                        <p:tgtEl>
+                                          <p:spTgt spid="5">
+                                            <p:txEl>
+                                              <p:pRg st="5" end="5"/>
+                                            </p:txEl>
+                                          </p:spTgt>
+                                        </p:tgtEl>
+                                        <p:attrNameLst>
+                                          <p:attrName>style.visibility</p:attrName>
+                                        </p:attrNameLst>
+                                      </p:cBhvr>
+                                      <p:to>
+                                        <p:strVal val="visible"/>
+                                      </p:to>
+                                    </p:set>
+                                  </p:childTnLst>
+                                </p:cTn>
+                              </p:par>
+                            </p:childTnLst>
+                          </p:cTn>
+                        </p:par>
+                      </p:childTnLst>
+                    </p:cTn>
+                  </p:par>
+                  <p:par>
+                    <p:cTn id="21" fill="hold">
+                      <p:stCondLst>
+                        <p:cond delay="indefinite"/>
+                      </p:stCondLst>
+                      <p:childTnLst>
+                        <p:par>
+                          <p:cTn id="22" fill="hold">
+                            <p:stCondLst>
+                              <p:cond delay="0"/>
+                            </p:stCondLst>
+                            <p:childTnLst>
+                              <p:par>
+                                <p:cTn id="23" presetID="1" presetClass="entr" presetSubtype="0" fill="hold" grpId="0" nodeType="clickEffect">
+                                  <p:stCondLst>
+                                    <p:cond delay="0"/>
+                                  </p:stCondLst>
+                                  <p:childTnLst>
+                                    <p:set>
+                                      <p:cBhvr>
+                                        <p:cTn id="24" dur="1" fill="hold">
+                                          <p:stCondLst>
+                                            <p:cond delay="0"/>
+                                          </p:stCondLst>
+                                        </p:cTn>
+                                        <p:tgtEl>
+                                          <p:spTgt spid="5">
+                                            <p:txEl>
+                                              <p:pRg st="6" end="6"/>
+                                            </p:txEl>
+                                          </p:spTgt>
+                                        </p:tgtEl>
+                                        <p:attrNameLst>
+                                          <p:attrName>style.visibility</p:attrName>
+                                        </p:attrNameLst>
+                                      </p:cBhvr>
+                                      <p:to>
+                                        <p:strVal val="visible"/>
+                                      </p:to>
+                                    </p:set>
+                                  </p:childTnLst>
+                                </p:cTn>
+                              </p:par>
+                              <p:par>
+                                <p:cTn id="25" presetID="1" presetClass="entr" presetSubtype="0" fill="hold" grpId="0" nodeType="withEffect">
+                                  <p:stCondLst>
+                                    <p:cond delay="0"/>
+                                  </p:stCondLst>
+                                  <p:childTnLst>
+                                    <p:set>
+                                      <p:cBhvr>
+                                        <p:cTn id="26" dur="1" fill="hold">
+                                          <p:stCondLst>
+                                            <p:cond delay="0"/>
+                                          </p:stCondLst>
+                                        </p:cTn>
+                                        <p:tgtEl>
+                                          <p:spTgt spid="5">
+                                            <p:txEl>
+                                              <p:pRg st="7" end="7"/>
+                                            </p:txEl>
+                                          </p:spTgt>
+                                        </p:tgtEl>
+                                        <p:attrNameLst>
+                                          <p:attrName>style.visibility</p:attrName>
+                                        </p:attrNameLst>
+                                      </p:cBhvr>
+                                      <p:to>
+                                        <p:strVal val="visible"/>
+                                      </p:to>
+                                    </p:set>
+                                  </p:childTnLst>
+                                </p:cTn>
+                              </p:par>
+                            </p:childTnLst>
+                          </p:cTn>
+                        </p:par>
+                      </p:childTnLst>
+                    </p:cTn>
+                  </p:par>
+                </p:childTnLst>
+              </p:cTn>
+              <p:prevCondLst>
+                <p:cond evt="onPrev" delay="0">
+                  <p:tgtEl>
+                    <p:sldTgt/>
+                  </p:tgtEl>
+                </p:cond>
+              </p:prevCondLst>
+              <p:nextCondLst>
+                <p:cond evt="onNext" delay="0">
+                  <p:tgtEl>
+                    <p:sldTgt/>
+                  </p:tgtEl>
+                </p:cond>
+              </p:nextCondLst>
+            </p:seq>
+          </p:childTnLst>
+        </p:cTn>
+      </p:par>
+    </p:tnLst>
+    <p:bldLst>
+      <p:bldP spid="5" grpId="0" build="p"/>
+    </p:bldLst>
+  </p:timing>
 </p:sld>
 </file>
 
@@ -9797,6 +10479,164 @@
           <a:p>
             <a:r>
               <a:rPr lang="en-GB" dirty="0" err="1"/>
+              <a:t>Begriffe</a:t>
+            </a:r>
+            <a:endParaRPr lang="en-AT" dirty="0"/>
+          </a:p>
+        </p:txBody>
+      </p:sp>
+      <p:pic>
+        <p:nvPicPr>
+          <p:cNvPr id="1026" name="Picture 2" descr="stub-diagram">
+            <a:extLst>
+              <a:ext uri="{FF2B5EF4-FFF2-40B4-BE49-F238E27FC236}">
+                <a16:creationId xmlns:a16="http://schemas.microsoft.com/office/drawing/2014/main" id="{6DC2372D-5959-24CE-AC6E-2CFB827E9595}"/>
+              </a:ext>
+            </a:extLst>
+          </p:cNvPr>
+          <p:cNvPicPr>
+            <a:picLocks noChangeAspect="1" noChangeArrowheads="1"/>
+          </p:cNvPicPr>
+          <p:nvPr/>
+        </p:nvPicPr>
+        <p:blipFill>
+          <a:blip r:embed="rId2">
+            <a:extLst>
+              <a:ext uri="{28A0092B-C50C-407E-A947-70E740481C1C}">
+                <a14:useLocalDpi xmlns:a14="http://schemas.microsoft.com/office/drawing/2010/main" val="0"/>
+              </a:ext>
+            </a:extLst>
+          </a:blip>
+          <a:srcRect/>
+          <a:stretch>
+            <a:fillRect/>
+          </a:stretch>
+        </p:blipFill>
+        <p:spPr bwMode="auto">
+          <a:xfrm>
+            <a:off x="527851" y="1648022"/>
+            <a:ext cx="4924425" cy="3743325"/>
+          </a:xfrm>
+          <a:prstGeom prst="rect">
+            <a:avLst/>
+          </a:prstGeom>
+          <a:noFill/>
+          <a:extLst>
+            <a:ext uri="{909E8E84-426E-40DD-AFC4-6F175D3DCCD1}">
+              <a14:hiddenFill xmlns:a14="http://schemas.microsoft.com/office/drawing/2010/main">
+                <a:solidFill>
+                  <a:srgbClr val="FFFFFF"/>
+                </a:solidFill>
+              </a14:hiddenFill>
+            </a:ext>
+          </a:extLst>
+        </p:spPr>
+      </p:pic>
+      <p:pic>
+        <p:nvPicPr>
+          <p:cNvPr id="1028" name="Picture 4">
+            <a:extLst>
+              <a:ext uri="{FF2B5EF4-FFF2-40B4-BE49-F238E27FC236}">
+                <a16:creationId xmlns:a16="http://schemas.microsoft.com/office/drawing/2014/main" id="{AB41A1FB-B64D-845B-9A14-21EE74DAD0BF}"/>
+              </a:ext>
+            </a:extLst>
+          </p:cNvPr>
+          <p:cNvPicPr>
+            <a:picLocks noChangeAspect="1" noChangeArrowheads="1"/>
+          </p:cNvPicPr>
+          <p:nvPr/>
+        </p:nvPicPr>
+        <p:blipFill>
+          <a:blip r:embed="rId3">
+            <a:extLst>
+              <a:ext uri="{28A0092B-C50C-407E-A947-70E740481C1C}">
+                <a14:useLocalDpi xmlns:a14="http://schemas.microsoft.com/office/drawing/2010/main" val="0"/>
+              </a:ext>
+            </a:extLst>
+          </a:blip>
+          <a:srcRect/>
+          <a:stretch>
+            <a:fillRect/>
+          </a:stretch>
+        </p:blipFill>
+        <p:spPr bwMode="auto">
+          <a:xfrm>
+            <a:off x="6205340" y="1547812"/>
+            <a:ext cx="5086350" cy="3762375"/>
+          </a:xfrm>
+          <a:prstGeom prst="rect">
+            <a:avLst/>
+          </a:prstGeom>
+          <a:noFill/>
+          <a:extLst>
+            <a:ext uri="{909E8E84-426E-40DD-AFC4-6F175D3DCCD1}">
+              <a14:hiddenFill xmlns:a14="http://schemas.microsoft.com/office/drawing/2010/main">
+                <a:solidFill>
+                  <a:srgbClr val="FFFFFF"/>
+                </a:solidFill>
+              </a14:hiddenFill>
+            </a:ext>
+          </a:extLst>
+        </p:spPr>
+      </p:pic>
+    </p:spTree>
+    <p:extLst>
+      <p:ext uri="{BB962C8B-B14F-4D97-AF65-F5344CB8AC3E}">
+        <p14:creationId xmlns:p14="http://schemas.microsoft.com/office/powerpoint/2010/main" val="1421001959"/>
+      </p:ext>
+    </p:extLst>
+  </p:cSld>
+  <p:clrMapOvr>
+    <a:masterClrMapping/>
+  </p:clrMapOvr>
+</p:sld>
+</file>
+
+<file path=ppt/slides/slide9.xml><?xml version="1.0" encoding="utf-8"?>
+<p:sld xmlns:a="http://schemas.openxmlformats.org/drawingml/2006/main" xmlns:r="http://schemas.openxmlformats.org/officeDocument/2006/relationships" xmlns:p="http://schemas.openxmlformats.org/presentationml/2006/main">
+  <p:cSld>
+    <p:spTree>
+      <p:nvGrpSpPr>
+        <p:cNvPr id="1" name=""/>
+        <p:cNvGrpSpPr/>
+        <p:nvPr/>
+      </p:nvGrpSpPr>
+      <p:grpSpPr>
+        <a:xfrm>
+          <a:off x="0" y="0"/>
+          <a:ext cx="0" cy="0"/>
+          <a:chOff x="0" y="0"/>
+          <a:chExt cx="0" cy="0"/>
+        </a:xfrm>
+      </p:grpSpPr>
+      <p:sp>
+        <p:nvSpPr>
+          <p:cNvPr id="3" name="Title 2">
+            <a:extLst>
+              <a:ext uri="{FF2B5EF4-FFF2-40B4-BE49-F238E27FC236}">
+                <a16:creationId xmlns:a16="http://schemas.microsoft.com/office/drawing/2014/main" id="{228C96B3-ED36-32E6-DD5A-F380A53C722F}"/>
+              </a:ext>
+            </a:extLst>
+          </p:cNvPr>
+          <p:cNvSpPr>
+            <a:spLocks noGrp="1"/>
+          </p:cNvSpPr>
+          <p:nvPr>
+            <p:ph type="title"/>
+          </p:nvPr>
+        </p:nvSpPr>
+        <p:spPr>
+          <a:xfrm>
+            <a:off x="837565" y="740701"/>
+            <a:ext cx="10346647" cy="594715"/>
+          </a:xfrm>
+        </p:spPr>
+        <p:txBody>
+          <a:bodyPr/>
+          <a:lstStyle/>
+          <a:p>
+            <a:r>
+              <a:rPr lang="en-GB" dirty="0" err="1"/>
               <a:t>Implementierung</a:t>
             </a:r>
             <a:endParaRPr lang="en-AT" dirty="0"/>
@@ -9911,334 +10751,6 @@
     <p:extLst>
       <p:ext uri="{BB962C8B-B14F-4D97-AF65-F5344CB8AC3E}">
         <p14:creationId xmlns:p14="http://schemas.microsoft.com/office/powerpoint/2010/main" val="499184475"/>
-      </p:ext>
-    </p:extLst>
-  </p:cSld>
-  <p:clrMapOvr>
-    <a:masterClrMapping/>
-  </p:clrMapOvr>
-</p:sld>
-</file>
-
-<file path=ppt/slides/slide9.xml><?xml version="1.0" encoding="utf-8"?>
-<p:sld xmlns:a="http://schemas.openxmlformats.org/drawingml/2006/main" xmlns:r="http://schemas.openxmlformats.org/officeDocument/2006/relationships" xmlns:p="http://schemas.openxmlformats.org/presentationml/2006/main">
-  <p:cSld>
-    <p:spTree>
-      <p:nvGrpSpPr>
-        <p:cNvPr id="1" name=""/>
-        <p:cNvGrpSpPr/>
-        <p:nvPr/>
-      </p:nvGrpSpPr>
-      <p:grpSpPr>
-        <a:xfrm>
-          <a:off x="0" y="0"/>
-          <a:ext cx="0" cy="0"/>
-          <a:chOff x="0" y="0"/>
-          <a:chExt cx="0" cy="0"/>
-        </a:xfrm>
-      </p:grpSpPr>
-      <p:sp>
-        <p:nvSpPr>
-          <p:cNvPr id="2" name="Title 1">
-            <a:extLst>
-              <a:ext uri="{FF2B5EF4-FFF2-40B4-BE49-F238E27FC236}">
-                <a16:creationId xmlns:a16="http://schemas.microsoft.com/office/drawing/2014/main" id="{9E36F4ED-769D-49BA-8930-4C7CE2636CA3}"/>
-              </a:ext>
-            </a:extLst>
-          </p:cNvPr>
-          <p:cNvSpPr>
-            <a:spLocks noGrp="1"/>
-          </p:cNvSpPr>
-          <p:nvPr>
-            <p:ph type="title"/>
-          </p:nvPr>
-        </p:nvSpPr>
-        <p:spPr/>
-        <p:txBody>
-          <a:bodyPr/>
-          <a:lstStyle/>
-          <a:p>
-            <a:r>
-              <a:rPr lang="en-US" dirty="0"/>
-              <a:t>Setup</a:t>
-            </a:r>
-            <a:endParaRPr lang="de-AT" dirty="0"/>
-          </a:p>
-        </p:txBody>
-      </p:sp>
-      <p:sp>
-        <p:nvSpPr>
-          <p:cNvPr id="3" name="Content Placeholder 2">
-            <a:extLst>
-              <a:ext uri="{FF2B5EF4-FFF2-40B4-BE49-F238E27FC236}">
-                <a16:creationId xmlns:a16="http://schemas.microsoft.com/office/drawing/2014/main" id="{0AFE0005-C90E-4ED3-9B5C-6119CEAE399E}"/>
-              </a:ext>
-            </a:extLst>
-          </p:cNvPr>
-          <p:cNvSpPr>
-            <a:spLocks noGrp="1"/>
-          </p:cNvSpPr>
-          <p:nvPr>
-            <p:ph type="body" sz="quarter" idx="13"/>
-          </p:nvPr>
-        </p:nvSpPr>
-        <p:spPr/>
-        <p:txBody>
-          <a:bodyPr/>
-          <a:lstStyle/>
-          <a:p>
-            <a:pPr marL="457200" lvl="1" indent="0">
-              <a:buNone/>
-            </a:pPr>
-            <a:endParaRPr lang="de-AT" dirty="0"/>
-          </a:p>
-          <a:p>
-            <a:endParaRPr lang="de-AT" dirty="0"/>
-          </a:p>
-        </p:txBody>
-      </p:sp>
-      <p:sp>
-        <p:nvSpPr>
-          <p:cNvPr id="5" name="Content Placeholder 2"/>
-          <p:cNvSpPr txBox="1">
-            <a:spLocks/>
-          </p:cNvSpPr>
-          <p:nvPr/>
-        </p:nvSpPr>
-        <p:spPr>
-          <a:xfrm>
-            <a:off x="838200" y="1825625"/>
-            <a:ext cx="10515600" cy="4351338"/>
-          </a:xfrm>
-          <a:prstGeom prst="rect">
-            <a:avLst/>
-          </a:prstGeom>
-        </p:spPr>
-        <p:txBody>
-          <a:bodyPr vert="horz" lIns="91440" tIns="45720" rIns="91440" bIns="45720" rtlCol="0">
-            <a:normAutofit/>
-          </a:bodyPr>
-          <a:lstStyle>
-            <a:lvl1pPr marL="228600" indent="-228600" algn="l" defTabSz="914400" rtl="0" eaLnBrk="1" latinLnBrk="0" hangingPunct="1">
-              <a:lnSpc>
-                <a:spcPct val="90000"/>
-              </a:lnSpc>
-              <a:spcBef>
-                <a:spcPts val="1000"/>
-              </a:spcBef>
-              <a:buFont typeface="Arial" panose="020B0604020202020204" pitchFamily="34" charset="0"/>
-              <a:buChar char="•"/>
-              <a:defRPr sz="2800" kern="1200">
-                <a:solidFill>
-                  <a:schemeClr val="tx1"/>
-                </a:solidFill>
-                <a:latin typeface="+mn-lt"/>
-                <a:ea typeface="+mn-ea"/>
-                <a:cs typeface="+mn-cs"/>
-              </a:defRPr>
-            </a:lvl1pPr>
-            <a:lvl2pPr marL="685800" indent="-228600" algn="l" defTabSz="914400" rtl="0" eaLnBrk="1" latinLnBrk="0" hangingPunct="1">
-              <a:lnSpc>
-                <a:spcPct val="90000"/>
-              </a:lnSpc>
-              <a:spcBef>
-                <a:spcPts val="500"/>
-              </a:spcBef>
-              <a:buFont typeface="Arial" panose="020B0604020202020204" pitchFamily="34" charset="0"/>
-              <a:buChar char="•"/>
-              <a:defRPr sz="2400" kern="1200">
-                <a:solidFill>
-                  <a:schemeClr val="tx1"/>
-                </a:solidFill>
-                <a:latin typeface="+mn-lt"/>
-                <a:ea typeface="+mn-ea"/>
-                <a:cs typeface="+mn-cs"/>
-              </a:defRPr>
-            </a:lvl2pPr>
-            <a:lvl3pPr marL="1143000" indent="-228600" algn="l" defTabSz="914400" rtl="0" eaLnBrk="1" latinLnBrk="0" hangingPunct="1">
-              <a:lnSpc>
-                <a:spcPct val="90000"/>
-              </a:lnSpc>
-              <a:spcBef>
-                <a:spcPts val="500"/>
-              </a:spcBef>
-              <a:buFont typeface="Arial" panose="020B0604020202020204" pitchFamily="34" charset="0"/>
-              <a:buChar char="•"/>
-              <a:defRPr sz="2000" kern="1200">
-                <a:solidFill>
-                  <a:schemeClr val="tx1"/>
-                </a:solidFill>
-                <a:latin typeface="+mn-lt"/>
-                <a:ea typeface="+mn-ea"/>
-                <a:cs typeface="+mn-cs"/>
-              </a:defRPr>
-            </a:lvl3pPr>
-            <a:lvl4pPr marL="1600200" indent="-228600" algn="l" defTabSz="914400" rtl="0" eaLnBrk="1" latinLnBrk="0" hangingPunct="1">
-              <a:lnSpc>
-                <a:spcPct val="90000"/>
-              </a:lnSpc>
-              <a:spcBef>
-                <a:spcPts val="500"/>
-              </a:spcBef>
-              <a:buFont typeface="Arial" panose="020B0604020202020204" pitchFamily="34" charset="0"/>
-              <a:buChar char="•"/>
-              <a:defRPr sz="1800" kern="1200">
-                <a:solidFill>
-                  <a:schemeClr val="tx1"/>
-                </a:solidFill>
-                <a:latin typeface="+mn-lt"/>
-                <a:ea typeface="+mn-ea"/>
-                <a:cs typeface="+mn-cs"/>
-              </a:defRPr>
-            </a:lvl4pPr>
-            <a:lvl5pPr marL="2057400" indent="-228600" algn="l" defTabSz="914400" rtl="0" eaLnBrk="1" latinLnBrk="0" hangingPunct="1">
-              <a:lnSpc>
-                <a:spcPct val="90000"/>
-              </a:lnSpc>
-              <a:spcBef>
-                <a:spcPts val="500"/>
-              </a:spcBef>
-              <a:buFont typeface="Arial" panose="020B0604020202020204" pitchFamily="34" charset="0"/>
-              <a:buChar char="•"/>
-              <a:defRPr sz="1800" kern="1200">
-                <a:solidFill>
-                  <a:schemeClr val="tx1"/>
-                </a:solidFill>
-                <a:latin typeface="+mn-lt"/>
-                <a:ea typeface="+mn-ea"/>
-                <a:cs typeface="+mn-cs"/>
-              </a:defRPr>
-            </a:lvl5pPr>
-            <a:lvl6pPr marL="2514600" indent="-228600" algn="l" defTabSz="914400" rtl="0" eaLnBrk="1" latinLnBrk="0" hangingPunct="1">
-              <a:lnSpc>
-                <a:spcPct val="90000"/>
-              </a:lnSpc>
-              <a:spcBef>
-                <a:spcPts val="500"/>
-              </a:spcBef>
-              <a:buFont typeface="Arial" panose="020B0604020202020204" pitchFamily="34" charset="0"/>
-              <a:buChar char="•"/>
-              <a:defRPr sz="1800" kern="1200">
-                <a:solidFill>
-                  <a:schemeClr val="tx1"/>
-                </a:solidFill>
-                <a:latin typeface="+mn-lt"/>
-                <a:ea typeface="+mn-ea"/>
-                <a:cs typeface="+mn-cs"/>
-              </a:defRPr>
-            </a:lvl6pPr>
-            <a:lvl7pPr marL="2971800" indent="-228600" algn="l" defTabSz="914400" rtl="0" eaLnBrk="1" latinLnBrk="0" hangingPunct="1">
-              <a:lnSpc>
-                <a:spcPct val="90000"/>
-              </a:lnSpc>
-              <a:spcBef>
-                <a:spcPts val="500"/>
-              </a:spcBef>
-              <a:buFont typeface="Arial" panose="020B0604020202020204" pitchFamily="34" charset="0"/>
-              <a:buChar char="•"/>
-              <a:defRPr sz="1800" kern="1200">
-                <a:solidFill>
-                  <a:schemeClr val="tx1"/>
-                </a:solidFill>
-                <a:latin typeface="+mn-lt"/>
-                <a:ea typeface="+mn-ea"/>
-                <a:cs typeface="+mn-cs"/>
-              </a:defRPr>
-            </a:lvl7pPr>
-            <a:lvl8pPr marL="3429000" indent="-228600" algn="l" defTabSz="914400" rtl="0" eaLnBrk="1" latinLnBrk="0" hangingPunct="1">
-              <a:lnSpc>
-                <a:spcPct val="90000"/>
-              </a:lnSpc>
-              <a:spcBef>
-                <a:spcPts val="500"/>
-              </a:spcBef>
-              <a:buFont typeface="Arial" panose="020B0604020202020204" pitchFamily="34" charset="0"/>
-              <a:buChar char="•"/>
-              <a:defRPr sz="1800" kern="1200">
-                <a:solidFill>
-                  <a:schemeClr val="tx1"/>
-                </a:solidFill>
-                <a:latin typeface="+mn-lt"/>
-                <a:ea typeface="+mn-ea"/>
-                <a:cs typeface="+mn-cs"/>
-              </a:defRPr>
-            </a:lvl8pPr>
-            <a:lvl9pPr marL="3886200" indent="-228600" algn="l" defTabSz="914400" rtl="0" eaLnBrk="1" latinLnBrk="0" hangingPunct="1">
-              <a:lnSpc>
-                <a:spcPct val="90000"/>
-              </a:lnSpc>
-              <a:spcBef>
-                <a:spcPts val="500"/>
-              </a:spcBef>
-              <a:buFont typeface="Arial" panose="020B0604020202020204" pitchFamily="34" charset="0"/>
-              <a:buChar char="•"/>
-              <a:defRPr sz="1800" kern="1200">
-                <a:solidFill>
-                  <a:schemeClr val="tx1"/>
-                </a:solidFill>
-                <a:latin typeface="+mn-lt"/>
-                <a:ea typeface="+mn-ea"/>
-                <a:cs typeface="+mn-cs"/>
-              </a:defRPr>
-            </a:lvl9pPr>
-          </a:lstStyle>
-          <a:p>
-            <a:pPr marL="285750" indent="-285750">
-              <a:buFont typeface="Arial" panose="020B0604020202020204" pitchFamily="34" charset="0"/>
-              <a:buChar char="•"/>
-            </a:pPr>
-            <a:r>
-              <a:rPr lang="de-AT" dirty="0">
-                <a:hlinkClick r:id="rId3"/>
-              </a:rPr>
-              <a:t>https://github.com/techtalk/CodingDojos.git</a:t>
-            </a:r>
-            <a:endParaRPr lang="de-AT" dirty="0"/>
-          </a:p>
-          <a:p>
-            <a:pPr lvl="1"/>
-            <a:r>
-              <a:rPr lang="en-GB" dirty="0"/>
-              <a:t>Branch “</a:t>
-            </a:r>
-            <a:r>
-              <a:rPr lang="en-GB" dirty="0" err="1"/>
-              <a:t>MockingDojo</a:t>
-            </a:r>
-            <a:r>
-              <a:rPr lang="en-GB" dirty="0"/>
-              <a:t>”</a:t>
-            </a:r>
-          </a:p>
-          <a:p>
-            <a:endParaRPr lang="en-GB" dirty="0"/>
-          </a:p>
-          <a:p>
-            <a:r>
-              <a:rPr lang="en-GB" dirty="0"/>
-              <a:t>https://www.tutorialspoint.com/design_pattern/strategy_pattern.htm</a:t>
-            </a:r>
-          </a:p>
-          <a:p>
-            <a:endParaRPr lang="en-GB" dirty="0"/>
-          </a:p>
-          <a:p>
-            <a:pPr lvl="2"/>
-            <a:endParaRPr lang="en-GB" dirty="0"/>
-          </a:p>
-          <a:p>
-            <a:pPr lvl="1"/>
-            <a:endParaRPr lang="en-GB" dirty="0"/>
-          </a:p>
-          <a:p>
-            <a:endParaRPr lang="en-GB" dirty="0"/>
-          </a:p>
-        </p:txBody>
-      </p:sp>
-    </p:spTree>
-    <p:extLst>
-      <p:ext uri="{BB962C8B-B14F-4D97-AF65-F5344CB8AC3E}">
-        <p14:creationId xmlns:p14="http://schemas.microsoft.com/office/powerpoint/2010/main" val="355067626"/>
       </p:ext>
     </p:extLst>
   </p:cSld>

</xml_diff>

<commit_message>
added one solution of dojo
</commit_message>
<xml_diff>
--- a/Mocking/CodingDojo_Mocking.pptx
+++ b/Mocking/CodingDojo_Mocking.pptx
@@ -218,7 +218,7 @@
           <a:p>
             <a:fld id="{550C01F7-036F-4DDB-91D3-72DE411FB950}" type="datetimeFigureOut">
               <a:rPr lang="de-AT" smtClean="0"/>
-              <a:t>18.08.2022</a:t>
+              <a:t>19.08.2022</a:t>
             </a:fld>
             <a:endParaRPr lang="de-AT"/>
           </a:p>
@@ -2982,7 +2982,7 @@
           <a:p>
             <a:fld id="{4F9BBA49-313F-47D7-A954-C3F504465317}" type="datetimeFigureOut">
               <a:rPr lang="de-AT" smtClean="0"/>
-              <a:t>18.08.2022</a:t>
+              <a:t>19.08.2022</a:t>
             </a:fld>
             <a:endParaRPr lang="de-AT"/>
           </a:p>
@@ -3152,7 +3152,7 @@
           <a:p>
             <a:fld id="{4F9BBA49-313F-47D7-A954-C3F504465317}" type="datetimeFigureOut">
               <a:rPr lang="de-AT" smtClean="0"/>
-              <a:t>18.08.2022</a:t>
+              <a:t>19.08.2022</a:t>
             </a:fld>
             <a:endParaRPr lang="de-AT"/>
           </a:p>
@@ -6896,6 +6896,26 @@
           </a:bodyPr>
           <a:lstStyle/>
           <a:p>
+            <a:r>
+              <a:rPr lang="de-DE" dirty="0"/>
+              <a:t>Nsubstitute</a:t>
+            </a:r>
+          </a:p>
+          <a:p>
+            <a:pPr lvl="1"/>
+            <a:r>
+              <a:rPr lang="de-DE" dirty="0"/>
+              <a:t>Beim Mocken von Klassen (nicht interfaces) müssen(!) nur virtual methoden mocked werden</a:t>
+            </a:r>
+          </a:p>
+          <a:p>
+            <a:r>
+              <a:rPr lang="de-DE"/>
+              <a:t>Microsoft.Fakes</a:t>
+            </a:r>
+          </a:p>
+          <a:p>
+            <a:pPr lvl="1"/>
             <a:endParaRPr lang="de-DE" dirty="0"/>
           </a:p>
         </p:txBody>

</xml_diff>